<commit_message>
v1.0 of analysis complete.
</commit_message>
<xml_diff>
--- a/FireEdge.pptx
+++ b/FireEdge.pptx
@@ -11,13 +11,13 @@
     <p:sldId id="256" r:id="rId2"/>
     <p:sldId id="257" r:id="rId3"/>
     <p:sldId id="258" r:id="rId4"/>
-    <p:sldId id="259" r:id="rId5"/>
-    <p:sldId id="262" r:id="rId6"/>
+    <p:sldId id="262" r:id="rId5"/>
+    <p:sldId id="259" r:id="rId6"/>
     <p:sldId id="264" r:id="rId7"/>
     <p:sldId id="263" r:id="rId8"/>
     <p:sldId id="266" r:id="rId9"/>
-    <p:sldId id="261" r:id="rId10"/>
-    <p:sldId id="265" r:id="rId11"/>
+    <p:sldId id="265" r:id="rId10"/>
+    <p:sldId id="261" r:id="rId11"/>
   </p:sldIdLst>
   <p:sldSz cx="12192000" cy="6858000"/>
   <p:notesSz cx="6858000" cy="9144000"/>
@@ -206,7 +206,7 @@
           <a:p>
             <a:fld id="{F63D0E84-12D3-A44E-A604-A1315E8B0D12}" type="datetimeFigureOut">
               <a:rPr lang="en-US" smtClean="0"/>
-              <a:t>3/7/21</a:t>
+              <a:t>3/9/21</a:t>
             </a:fld>
             <a:endParaRPr lang="en-US"/>
           </a:p>
@@ -519,7 +519,7 @@
           <a:p>
             <a:r>
               <a:rPr lang="en-US" dirty="0"/>
-              <a:t>- Because the </a:t>
+              <a:t>Tying the scores on this newly developed test to some sort of external criteria, something that would help us establish that using the test makes sense to hire for this position. </a:t>
             </a:r>
           </a:p>
         </p:txBody>
@@ -628,7 +628,7 @@
           <a:p>
             <a:fld id="{5F256778-F011-4243-83FD-2F79BB5DEBFB}" type="slidenum">
               <a:rPr lang="en-US" smtClean="0"/>
-              <a:t>5</a:t>
+              <a:t>4</a:t>
             </a:fld>
             <a:endParaRPr lang="en-US"/>
           </a:p>
@@ -693,7 +693,94 @@
           <a:p>
             <a:r>
               <a:rPr lang="en-US" dirty="0"/>
-              <a:t>The omni-bus F test in a linear regression denotes that the independent variables in your study, mainly, the FireEdge score, does contribute a significant effect to the model and should be retained.</a:t>
+              <a:t>EDA revolves around imputation of missing data, removing outliers, identifying trends, multi-collinearity, etc.</a:t>
+            </a:r>
+          </a:p>
+        </p:txBody>
+      </p:sp>
+      <p:sp>
+        <p:nvSpPr>
+          <p:cNvPr id="4" name="Slide Number Placeholder 3"/>
+          <p:cNvSpPr>
+            <a:spLocks noGrp="1"/>
+          </p:cNvSpPr>
+          <p:nvPr>
+            <p:ph type="sldNum" sz="quarter" idx="5"/>
+          </p:nvPr>
+        </p:nvSpPr>
+        <p:spPr/>
+        <p:txBody>
+          <a:bodyPr/>
+          <a:lstStyle/>
+          <a:p>
+            <a:fld id="{5F256778-F011-4243-83FD-2F79BB5DEBFB}" type="slidenum">
+              <a:rPr lang="en-US" smtClean="0"/>
+              <a:t>5</a:t>
+            </a:fld>
+            <a:endParaRPr lang="en-US"/>
+          </a:p>
+        </p:txBody>
+      </p:sp>
+    </p:spTree>
+    <p:extLst>
+      <p:ext uri="{BB962C8B-B14F-4D97-AF65-F5344CB8AC3E}">
+        <p14:creationId xmlns:p14="http://schemas.microsoft.com/office/powerpoint/2010/main" val="4109545690"/>
+      </p:ext>
+    </p:extLst>
+  </p:cSld>
+  <p:clrMapOvr>
+    <a:masterClrMapping/>
+  </p:clrMapOvr>
+</p:notes>
+</file>
+
+<file path=ppt/notesSlides/notesSlide4.xml><?xml version="1.0" encoding="utf-8"?>
+<p:notes xmlns:a="http://schemas.openxmlformats.org/drawingml/2006/main" xmlns:r="http://schemas.openxmlformats.org/officeDocument/2006/relationships" xmlns:p="http://schemas.openxmlformats.org/presentationml/2006/main">
+  <p:cSld>
+    <p:spTree>
+      <p:nvGrpSpPr>
+        <p:cNvPr id="1" name=""/>
+        <p:cNvGrpSpPr/>
+        <p:nvPr/>
+      </p:nvGrpSpPr>
+      <p:grpSpPr>
+        <a:xfrm>
+          <a:off x="0" y="0"/>
+          <a:ext cx="0" cy="0"/>
+          <a:chOff x="0" y="0"/>
+          <a:chExt cx="0" cy="0"/>
+        </a:xfrm>
+      </p:grpSpPr>
+      <p:sp>
+        <p:nvSpPr>
+          <p:cNvPr id="2" name="Slide Image Placeholder 1"/>
+          <p:cNvSpPr>
+            <a:spLocks noGrp="1" noRot="1" noChangeAspect="1"/>
+          </p:cNvSpPr>
+          <p:nvPr>
+            <p:ph type="sldImg"/>
+          </p:nvPr>
+        </p:nvSpPr>
+        <p:spPr/>
+      </p:sp>
+      <p:sp>
+        <p:nvSpPr>
+          <p:cNvPr id="3" name="Notes Placeholder 2"/>
+          <p:cNvSpPr>
+            <a:spLocks noGrp="1"/>
+          </p:cNvSpPr>
+          <p:nvPr>
+            <p:ph type="body" idx="1"/>
+          </p:nvPr>
+        </p:nvSpPr>
+        <p:spPr/>
+        <p:txBody>
+          <a:bodyPr/>
+          <a:lstStyle/>
+          <a:p>
+            <a:r>
+              <a:rPr lang="en-US" dirty="0"/>
+              <a:t>Linear regression is simply an extension of the correlational analysis from the slide before.</a:t>
             </a:r>
           </a:p>
         </p:txBody>
@@ -725,6 +812,180 @@
     <p:extLst>
       <p:ext uri="{BB962C8B-B14F-4D97-AF65-F5344CB8AC3E}">
         <p14:creationId xmlns:p14="http://schemas.microsoft.com/office/powerpoint/2010/main" val="715025662"/>
+      </p:ext>
+    </p:extLst>
+  </p:cSld>
+  <p:clrMapOvr>
+    <a:masterClrMapping/>
+  </p:clrMapOvr>
+</p:notes>
+</file>
+
+<file path=ppt/notesSlides/notesSlide5.xml><?xml version="1.0" encoding="utf-8"?>
+<p:notes xmlns:a="http://schemas.openxmlformats.org/drawingml/2006/main" xmlns:r="http://schemas.openxmlformats.org/officeDocument/2006/relationships" xmlns:p="http://schemas.openxmlformats.org/presentationml/2006/main">
+  <p:cSld>
+    <p:spTree>
+      <p:nvGrpSpPr>
+        <p:cNvPr id="1" name=""/>
+        <p:cNvGrpSpPr/>
+        <p:nvPr/>
+      </p:nvGrpSpPr>
+      <p:grpSpPr>
+        <a:xfrm>
+          <a:off x="0" y="0"/>
+          <a:ext cx="0" cy="0"/>
+          <a:chOff x="0" y="0"/>
+          <a:chExt cx="0" cy="0"/>
+        </a:xfrm>
+      </p:grpSpPr>
+      <p:sp>
+        <p:nvSpPr>
+          <p:cNvPr id="2" name="Slide Image Placeholder 1"/>
+          <p:cNvSpPr>
+            <a:spLocks noGrp="1" noRot="1" noChangeAspect="1"/>
+          </p:cNvSpPr>
+          <p:nvPr>
+            <p:ph type="sldImg"/>
+          </p:nvPr>
+        </p:nvSpPr>
+        <p:spPr/>
+      </p:sp>
+      <p:sp>
+        <p:nvSpPr>
+          <p:cNvPr id="3" name="Notes Placeholder 2"/>
+          <p:cNvSpPr>
+            <a:spLocks noGrp="1"/>
+          </p:cNvSpPr>
+          <p:nvPr>
+            <p:ph type="body" idx="1"/>
+          </p:nvPr>
+        </p:nvSpPr>
+        <p:spPr/>
+        <p:txBody>
+          <a:bodyPr/>
+          <a:lstStyle/>
+          <a:p>
+            <a:r>
+              <a:rPr lang="en-US" dirty="0"/>
+              <a:t>Diversity and equity is an important piece</a:t>
+            </a:r>
+          </a:p>
+        </p:txBody>
+      </p:sp>
+      <p:sp>
+        <p:nvSpPr>
+          <p:cNvPr id="4" name="Slide Number Placeholder 3"/>
+          <p:cNvSpPr>
+            <a:spLocks noGrp="1"/>
+          </p:cNvSpPr>
+          <p:nvPr>
+            <p:ph type="sldNum" sz="quarter" idx="5"/>
+          </p:nvPr>
+        </p:nvSpPr>
+        <p:spPr/>
+        <p:txBody>
+          <a:bodyPr/>
+          <a:lstStyle/>
+          <a:p>
+            <a:fld id="{5F256778-F011-4243-83FD-2F79BB5DEBFB}" type="slidenum">
+              <a:rPr lang="en-US" smtClean="0"/>
+              <a:t>8</a:t>
+            </a:fld>
+            <a:endParaRPr lang="en-US"/>
+          </a:p>
+        </p:txBody>
+      </p:sp>
+    </p:spTree>
+    <p:extLst>
+      <p:ext uri="{BB962C8B-B14F-4D97-AF65-F5344CB8AC3E}">
+        <p14:creationId xmlns:p14="http://schemas.microsoft.com/office/powerpoint/2010/main" val="1467343771"/>
+      </p:ext>
+    </p:extLst>
+  </p:cSld>
+  <p:clrMapOvr>
+    <a:masterClrMapping/>
+  </p:clrMapOvr>
+</p:notes>
+</file>
+
+<file path=ppt/notesSlides/notesSlide6.xml><?xml version="1.0" encoding="utf-8"?>
+<p:notes xmlns:a="http://schemas.openxmlformats.org/drawingml/2006/main" xmlns:r="http://schemas.openxmlformats.org/officeDocument/2006/relationships" xmlns:p="http://schemas.openxmlformats.org/presentationml/2006/main">
+  <p:cSld>
+    <p:spTree>
+      <p:nvGrpSpPr>
+        <p:cNvPr id="1" name=""/>
+        <p:cNvGrpSpPr/>
+        <p:nvPr/>
+      </p:nvGrpSpPr>
+      <p:grpSpPr>
+        <a:xfrm>
+          <a:off x="0" y="0"/>
+          <a:ext cx="0" cy="0"/>
+          <a:chOff x="0" y="0"/>
+          <a:chExt cx="0" cy="0"/>
+        </a:xfrm>
+      </p:grpSpPr>
+      <p:sp>
+        <p:nvSpPr>
+          <p:cNvPr id="2" name="Slide Image Placeholder 1"/>
+          <p:cNvSpPr>
+            <a:spLocks noGrp="1" noRot="1" noChangeAspect="1"/>
+          </p:cNvSpPr>
+          <p:nvPr>
+            <p:ph type="sldImg"/>
+          </p:nvPr>
+        </p:nvSpPr>
+        <p:spPr/>
+      </p:sp>
+      <p:sp>
+        <p:nvSpPr>
+          <p:cNvPr id="3" name="Notes Placeholder 2"/>
+          <p:cNvSpPr>
+            <a:spLocks noGrp="1"/>
+          </p:cNvSpPr>
+          <p:nvPr>
+            <p:ph type="body" idx="1"/>
+          </p:nvPr>
+        </p:nvSpPr>
+        <p:spPr/>
+        <p:txBody>
+          <a:bodyPr/>
+          <a:lstStyle/>
+          <a:p>
+            <a:r>
+              <a:rPr lang="en-US" dirty="0"/>
+              <a:t>The conclusions revolve around two very important concepts, one, that the test we are employing is tied to significant performance feedback and two, that the test does not cause bias against anybody by race.</a:t>
+            </a:r>
+          </a:p>
+        </p:txBody>
+      </p:sp>
+      <p:sp>
+        <p:nvSpPr>
+          <p:cNvPr id="4" name="Slide Number Placeholder 3"/>
+          <p:cNvSpPr>
+            <a:spLocks noGrp="1"/>
+          </p:cNvSpPr>
+          <p:nvPr>
+            <p:ph type="sldNum" sz="quarter" idx="5"/>
+          </p:nvPr>
+        </p:nvSpPr>
+        <p:spPr/>
+        <p:txBody>
+          <a:bodyPr/>
+          <a:lstStyle/>
+          <a:p>
+            <a:fld id="{5F256778-F011-4243-83FD-2F79BB5DEBFB}" type="slidenum">
+              <a:rPr lang="en-US" smtClean="0"/>
+              <a:t>9</a:t>
+            </a:fld>
+            <a:endParaRPr lang="en-US"/>
+          </a:p>
+        </p:txBody>
+      </p:sp>
+    </p:spTree>
+    <p:extLst>
+      <p:ext uri="{BB962C8B-B14F-4D97-AF65-F5344CB8AC3E}">
+        <p14:creationId xmlns:p14="http://schemas.microsoft.com/office/powerpoint/2010/main" val="3131436874"/>
       </p:ext>
     </p:extLst>
   </p:cSld>
@@ -890,7 +1151,7 @@
           <a:p>
             <a:fld id="{02AC24A9-CCB6-4F8D-B8DB-C2F3692CFA5A}" type="datetimeFigureOut">
               <a:rPr lang="en-US" smtClean="0"/>
-              <a:t>3/7/21</a:t>
+              <a:t>3/9/21</a:t>
             </a:fld>
             <a:endParaRPr lang="en-US" dirty="0"/>
           </a:p>
@@ -1260,7 +1521,7 @@
           <a:p>
             <a:fld id="{02AC24A9-CCB6-4F8D-B8DB-C2F3692CFA5A}" type="datetimeFigureOut">
               <a:rPr lang="en-US" smtClean="0"/>
-              <a:t>3/7/21</a:t>
+              <a:t>3/9/21</a:t>
             </a:fld>
             <a:endParaRPr lang="en-US"/>
           </a:p>
@@ -1469,7 +1730,7 @@
           <a:p>
             <a:fld id="{02AC24A9-CCB6-4F8D-B8DB-C2F3692CFA5A}" type="datetimeFigureOut">
               <a:rPr lang="en-US" smtClean="0"/>
-              <a:t>3/7/21</a:t>
+              <a:t>3/9/21</a:t>
             </a:fld>
             <a:endParaRPr lang="en-US"/>
           </a:p>
@@ -1939,7 +2200,7 @@
           <a:p>
             <a:fld id="{02AC24A9-CCB6-4F8D-B8DB-C2F3692CFA5A}" type="datetimeFigureOut">
               <a:rPr lang="en-US" smtClean="0"/>
-              <a:t>3/7/21</a:t>
+              <a:t>3/9/21</a:t>
             </a:fld>
             <a:endParaRPr lang="en-US"/>
           </a:p>
@@ -2393,7 +2654,7 @@
           <a:p>
             <a:fld id="{02AC24A9-CCB6-4F8D-B8DB-C2F3692CFA5A}" type="datetimeFigureOut">
               <a:rPr lang="en-US" smtClean="0"/>
-              <a:t>3/7/21</a:t>
+              <a:t>3/9/21</a:t>
             </a:fld>
             <a:endParaRPr lang="en-US"/>
           </a:p>
@@ -2925,7 +3186,7 @@
           <a:p>
             <a:fld id="{02AC24A9-CCB6-4F8D-B8DB-C2F3692CFA5A}" type="datetimeFigureOut">
               <a:rPr lang="en-US" smtClean="0"/>
-              <a:t>3/7/21</a:t>
+              <a:t>3/9/21</a:t>
             </a:fld>
             <a:endParaRPr lang="en-US"/>
           </a:p>
@@ -3624,7 +3885,7 @@
           <a:p>
             <a:fld id="{02AC24A9-CCB6-4F8D-B8DB-C2F3692CFA5A}" type="datetimeFigureOut">
               <a:rPr lang="en-US" smtClean="0"/>
-              <a:t>3/7/21</a:t>
+              <a:t>3/9/21</a:t>
             </a:fld>
             <a:endParaRPr lang="en-US"/>
           </a:p>
@@ -3953,7 +4214,7 @@
           <a:p>
             <a:fld id="{02AC24A9-CCB6-4F8D-B8DB-C2F3692CFA5A}" type="datetimeFigureOut">
               <a:rPr lang="en-US" smtClean="0"/>
-              <a:t>3/7/21</a:t>
+              <a:t>3/9/21</a:t>
             </a:fld>
             <a:endParaRPr lang="en-US"/>
           </a:p>
@@ -4066,7 +4327,7 @@
           <a:p>
             <a:fld id="{02AC24A9-CCB6-4F8D-B8DB-C2F3692CFA5A}" type="datetimeFigureOut">
               <a:rPr lang="en-US" smtClean="0"/>
-              <a:t>3/7/21</a:t>
+              <a:t>3/9/21</a:t>
             </a:fld>
             <a:endParaRPr lang="en-US"/>
           </a:p>
@@ -4561,7 +4822,7 @@
           <a:p>
             <a:fld id="{02AC24A9-CCB6-4F8D-B8DB-C2F3692CFA5A}" type="datetimeFigureOut">
               <a:rPr lang="en-US" smtClean="0"/>
-              <a:t>3/7/21</a:t>
+              <a:t>3/9/21</a:t>
             </a:fld>
             <a:endParaRPr lang="en-US" dirty="0"/>
           </a:p>
@@ -5038,7 +5299,7 @@
           <a:p>
             <a:fld id="{02AC24A9-CCB6-4F8D-B8DB-C2F3692CFA5A}" type="datetimeFigureOut">
               <a:rPr lang="en-US" smtClean="0"/>
-              <a:t>3/7/21</a:t>
+              <a:t>3/9/21</a:t>
             </a:fld>
             <a:endParaRPr lang="en-US"/>
           </a:p>
@@ -5281,7 +5542,7 @@
           <a:p>
             <a:fld id="{02AC24A9-CCB6-4F8D-B8DB-C2F3692CFA5A}" type="datetimeFigureOut">
               <a:rPr lang="en-US" smtClean="0"/>
-              <a:t>3/7/21</a:t>
+              <a:t>3/9/21</a:t>
             </a:fld>
             <a:endParaRPr lang="en-US"/>
           </a:p>
@@ -6106,7 +6367,7 @@
           <p:cNvPr id="2" name="Title 1">
             <a:extLst>
               <a:ext uri="{FF2B5EF4-FFF2-40B4-BE49-F238E27FC236}">
-                <a16:creationId xmlns:a16="http://schemas.microsoft.com/office/drawing/2014/main" id="{B6470270-9ACC-8F48-B55B-C856C7F36388}"/>
+                <a16:creationId xmlns:a16="http://schemas.microsoft.com/office/drawing/2014/main" id="{C4E51C85-CBB3-5946-A05B-4418E139C640}"/>
               </a:ext>
             </a:extLst>
           </p:cNvPr>
@@ -6124,7 +6385,7 @@
           <a:p>
             <a:r>
               <a:rPr lang="en-US" dirty="0"/>
-              <a:t>Conclusion</a:t>
+              <a:t>Research Study Limitations</a:t>
             </a:r>
           </a:p>
         </p:txBody>
@@ -6134,7 +6395,7 @@
           <p:cNvPr id="3" name="Content Placeholder 2">
             <a:extLst>
               <a:ext uri="{FF2B5EF4-FFF2-40B4-BE49-F238E27FC236}">
-                <a16:creationId xmlns:a16="http://schemas.microsoft.com/office/drawing/2014/main" id="{ED858B69-4EC0-6F41-B865-6D8348A708F8}"/>
+                <a16:creationId xmlns:a16="http://schemas.microsoft.com/office/drawing/2014/main" id="{C904CA65-7CA9-4B4F-9578-BCDD809E9874}"/>
               </a:ext>
             </a:extLst>
           </p:cNvPr>
@@ -6147,88 +6408,49 @@
         </p:nvSpPr>
         <p:spPr>
           <a:xfrm>
-            <a:off x="537328" y="2379167"/>
-            <a:ext cx="11189616" cy="4079295"/>
+            <a:off x="580107" y="2478024"/>
+            <a:ext cx="10611376" cy="3941064"/>
           </a:xfrm>
         </p:spPr>
         <p:txBody>
-          <a:bodyPr>
-            <a:normAutofit fontScale="92500"/>
-          </a:bodyPr>
-          <a:lstStyle/>
-          <a:p>
-            <a:r>
-              <a:rPr lang="en-US" dirty="0"/>
-              <a:t>Empirical evidence that test scores are significantly correlated with subsequent firefighter job performance(</a:t>
-            </a:r>
-            <a:r>
-              <a:rPr lang="en-US" i="1" dirty="0"/>
-              <a:t>r</a:t>
-            </a:r>
-            <a:r>
-              <a:rPr lang="en-US" dirty="0"/>
-              <a:t> = .273, </a:t>
-            </a:r>
-            <a:r>
-              <a:rPr lang="en-US" i="1" dirty="0"/>
-              <a:t>p</a:t>
-            </a:r>
-            <a:r>
-              <a:rPr lang="en-US" dirty="0"/>
-              <a:t> &lt; .000)</a:t>
-            </a:r>
-          </a:p>
-          <a:p>
-            <a:r>
-              <a:rPr lang="en-US" dirty="0"/>
-              <a:t>Analysis of Variance (ANOVA) test concludes no significant differences on </a:t>
-            </a:r>
-            <a:r>
-              <a:rPr lang="en-US" i="1" dirty="0"/>
-              <a:t>FireEdge</a:t>
-            </a:r>
-            <a:r>
-              <a:rPr lang="en-US" dirty="0"/>
-              <a:t> test score by Race</a:t>
-            </a:r>
-          </a:p>
-          <a:p>
-            <a:pPr lvl="1"/>
-            <a:r>
-              <a:rPr lang="en-US" dirty="0"/>
-              <a:t>Ensures no bias/adverse impact in test scores</a:t>
-            </a:r>
-          </a:p>
-          <a:p>
-            <a:pPr lvl="1"/>
-            <a:r>
-              <a:rPr lang="en-US" dirty="0"/>
-              <a:t>Rank ordering of top-down scoring appropriate</a:t>
-            </a:r>
-          </a:p>
-          <a:p>
-            <a:r>
-              <a:rPr lang="en-US" dirty="0"/>
-              <a:t>We conclude that higher scores on the </a:t>
-            </a:r>
-            <a:r>
-              <a:rPr lang="en-US" i="1" dirty="0"/>
-              <a:t>FireEdge</a:t>
-            </a:r>
-            <a:r>
-              <a:rPr lang="en-US" dirty="0"/>
-              <a:t> will yield more successful firefighters in general on the job, without adverse impact</a:t>
-            </a:r>
-          </a:p>
-          <a:p>
-            <a:endParaRPr lang="en-US" dirty="0"/>
+          <a:bodyPr/>
+          <a:lstStyle/>
+          <a:p>
+            <a:r>
+              <a:rPr lang="en-US" dirty="0"/>
+              <a:t>Concurrent study design</a:t>
+            </a:r>
+          </a:p>
+          <a:p>
+            <a:r>
+              <a:rPr lang="en-US" dirty="0"/>
+              <a:t>More diversity in study participants</a:t>
+            </a:r>
+          </a:p>
+          <a:p>
+            <a:r>
+              <a:rPr lang="en-US" dirty="0"/>
+              <a:t>Potential bias in job performance ratings </a:t>
+            </a:r>
+          </a:p>
+          <a:p>
+            <a:r>
+              <a:rPr lang="en-US" dirty="0"/>
+              <a:t>Overpredicting performance due to qualified applicant pool</a:t>
+            </a:r>
+          </a:p>
+          <a:p>
+            <a:r>
+              <a:rPr lang="en-US" dirty="0"/>
+              <a:t>Correcting correlation coefficients</a:t>
+            </a:r>
           </a:p>
         </p:txBody>
       </p:sp>
     </p:spTree>
     <p:extLst>
       <p:ext uri="{BB962C8B-B14F-4D97-AF65-F5344CB8AC3E}">
-        <p14:creationId xmlns:p14="http://schemas.microsoft.com/office/powerpoint/2010/main" val="245607193"/>
+        <p14:creationId xmlns:p14="http://schemas.microsoft.com/office/powerpoint/2010/main" val="537083193"/>
       </p:ext>
     </p:extLst>
   </p:cSld>
@@ -6278,7 +6500,7 @@
           <a:p>
             <a:r>
               <a:rPr lang="en-US" dirty="0"/>
-              <a:t>Background Knowledge</a:t>
+              <a:t>Background/Context</a:t>
             </a:r>
           </a:p>
         </p:txBody>
@@ -6301,8 +6523,8 @@
         </p:nvSpPr>
         <p:spPr>
           <a:xfrm>
-            <a:off x="538843" y="2478024"/>
-            <a:ext cx="11176907" cy="4045240"/>
+            <a:off x="538843" y="2478023"/>
+            <a:ext cx="11176907" cy="4255285"/>
           </a:xfrm>
         </p:spPr>
         <p:txBody>
@@ -6411,7 +6633,7 @@
           <a:p>
             <a:r>
               <a:rPr lang="en-US" dirty="0"/>
-              <a:t>Presentation Overview</a:t>
+              <a:t>Research Study Purpose</a:t>
             </a:r>
           </a:p>
         </p:txBody>
@@ -6445,8 +6667,12 @@
           <a:lstStyle/>
           <a:p>
             <a:r>
-              <a:rPr lang="en-US" dirty="0"/>
-              <a:t>Overall goal was to establish predictive evidence of job performance from test scores</a:t>
+              <a:rPr lang="en-US" b="1" dirty="0"/>
+              <a:t>Goal:</a:t>
+            </a:r>
+            <a:r>
+              <a:rPr lang="en-US" dirty="0"/>
+              <a:t> To establish predictive evidence of job performance from test scores</a:t>
             </a:r>
           </a:p>
           <a:p>
@@ -6544,7 +6770,7 @@
           <p:cNvPr id="2" name="Title 1">
             <a:extLst>
               <a:ext uri="{FF2B5EF4-FFF2-40B4-BE49-F238E27FC236}">
-                <a16:creationId xmlns:a16="http://schemas.microsoft.com/office/drawing/2014/main" id="{70A74290-7A5B-944D-96CB-64FAD60C5762}"/>
+                <a16:creationId xmlns:a16="http://schemas.microsoft.com/office/drawing/2014/main" id="{B6470270-9ACC-8F48-B55B-C856C7F36388}"/>
               </a:ext>
             </a:extLst>
           </p:cNvPr>
@@ -6562,172 +6788,7 @@
           <a:p>
             <a:r>
               <a:rPr lang="en-US" dirty="0"/>
-              <a:t>Research Study Design</a:t>
-            </a:r>
-          </a:p>
-        </p:txBody>
-      </p:sp>
-      <p:sp>
-        <p:nvSpPr>
-          <p:cNvPr id="3" name="Content Placeholder 2">
-            <a:extLst>
-              <a:ext uri="{FF2B5EF4-FFF2-40B4-BE49-F238E27FC236}">
-                <a16:creationId xmlns:a16="http://schemas.microsoft.com/office/drawing/2014/main" id="{87605321-9DDD-BF41-91D9-D7179BA8A3F1}"/>
-              </a:ext>
-            </a:extLst>
-          </p:cNvPr>
-          <p:cNvSpPr>
-            <a:spLocks noGrp="1"/>
-          </p:cNvSpPr>
-          <p:nvPr>
-            <p:ph idx="1"/>
-          </p:nvPr>
-        </p:nvSpPr>
-        <p:spPr>
-          <a:xfrm>
-            <a:off x="490194" y="2459170"/>
-            <a:ext cx="11265031" cy="4102390"/>
-          </a:xfrm>
-        </p:spPr>
-        <p:txBody>
-          <a:bodyPr>
-            <a:normAutofit/>
-          </a:bodyPr>
-          <a:lstStyle/>
-          <a:p>
-            <a:pPr marL="514350" indent="-514350">
-              <a:buFont typeface="+mj-lt"/>
-              <a:buAutoNum type="arabicPeriod"/>
-            </a:pPr>
-            <a:r>
-              <a:rPr lang="en-US" dirty="0"/>
-              <a:t>Partnered with agencies to provide study participants</a:t>
-            </a:r>
-          </a:p>
-          <a:p>
-            <a:pPr marL="914400" lvl="1" indent="-457200">
-              <a:buFont typeface="+mj-lt"/>
-              <a:buAutoNum type="alphaLcPeriod"/>
-            </a:pPr>
-            <a:r>
-              <a:rPr lang="en-US" dirty="0"/>
-              <a:t>Created a stratified sampling plan from available personnel</a:t>
-            </a:r>
-          </a:p>
-          <a:p>
-            <a:pPr marL="514350" indent="-514350">
-              <a:buFont typeface="+mj-lt"/>
-              <a:buAutoNum type="arabicPeriod"/>
-            </a:pPr>
-            <a:r>
-              <a:rPr lang="en-US" dirty="0"/>
-              <a:t>Administered </a:t>
-            </a:r>
-            <a:r>
-              <a:rPr lang="en-US" i="1" dirty="0"/>
-              <a:t>FireEdge</a:t>
-            </a:r>
-            <a:r>
-              <a:rPr lang="en-US" dirty="0"/>
-              <a:t> under standardized conditions</a:t>
-            </a:r>
-          </a:p>
-          <a:p>
-            <a:pPr marL="514350" indent="-514350">
-              <a:buFont typeface="+mj-lt"/>
-              <a:buAutoNum type="arabicPeriod"/>
-            </a:pPr>
-            <a:r>
-              <a:rPr lang="en-US" dirty="0"/>
-              <a:t>Obtained ratings of job performance from supervisors</a:t>
-            </a:r>
-          </a:p>
-          <a:p>
-            <a:pPr marL="514350" indent="-514350">
-              <a:buFont typeface="+mj-lt"/>
-              <a:buAutoNum type="arabicPeriod"/>
-            </a:pPr>
-            <a:r>
-              <a:rPr lang="en-US" dirty="0"/>
-              <a:t>Performed exploratory data analysis (EDA)</a:t>
-            </a:r>
-          </a:p>
-          <a:p>
-            <a:pPr marL="514350" indent="-514350">
-              <a:buFont typeface="+mj-lt"/>
-              <a:buAutoNum type="arabicPeriod"/>
-            </a:pPr>
-            <a:r>
-              <a:rPr lang="en-US" dirty="0"/>
-              <a:t>Ran several statistical analyses (correlation, regression, ANOVA)</a:t>
-            </a:r>
-          </a:p>
-          <a:p>
-            <a:pPr marL="514350" indent="-514350">
-              <a:buFont typeface="+mj-lt"/>
-              <a:buAutoNum type="arabicPeriod"/>
-            </a:pPr>
-            <a:r>
-              <a:rPr lang="en-US" dirty="0"/>
-              <a:t>Summarized findings and developed technical documentation</a:t>
-            </a:r>
-          </a:p>
-        </p:txBody>
-      </p:sp>
-    </p:spTree>
-    <p:extLst>
-      <p:ext uri="{BB962C8B-B14F-4D97-AF65-F5344CB8AC3E}">
-        <p14:creationId xmlns:p14="http://schemas.microsoft.com/office/powerpoint/2010/main" val="2473716912"/>
-      </p:ext>
-    </p:extLst>
-  </p:cSld>
-  <p:clrMapOvr>
-    <a:masterClrMapping/>
-  </p:clrMapOvr>
-</p:sld>
-</file>
-
-<file path=ppt/slides/slide5.xml><?xml version="1.0" encoding="utf-8"?>
-<p:sld xmlns:a="http://schemas.openxmlformats.org/drawingml/2006/main" xmlns:r="http://schemas.openxmlformats.org/officeDocument/2006/relationships" xmlns:p="http://schemas.openxmlformats.org/presentationml/2006/main">
-  <p:cSld>
-    <p:spTree>
-      <p:nvGrpSpPr>
-        <p:cNvPr id="1" name=""/>
-        <p:cNvGrpSpPr/>
-        <p:nvPr/>
-      </p:nvGrpSpPr>
-      <p:grpSpPr>
-        <a:xfrm>
-          <a:off x="0" y="0"/>
-          <a:ext cx="0" cy="0"/>
-          <a:chOff x="0" y="0"/>
-          <a:chExt cx="0" cy="0"/>
-        </a:xfrm>
-      </p:grpSpPr>
-      <p:sp>
-        <p:nvSpPr>
-          <p:cNvPr id="2" name="Title 1">
-            <a:extLst>
-              <a:ext uri="{FF2B5EF4-FFF2-40B4-BE49-F238E27FC236}">
-                <a16:creationId xmlns:a16="http://schemas.microsoft.com/office/drawing/2014/main" id="{B6470270-9ACC-8F48-B55B-C856C7F36388}"/>
-              </a:ext>
-            </a:extLst>
-          </p:cNvPr>
-          <p:cNvSpPr>
-            <a:spLocks noGrp="1"/>
-          </p:cNvSpPr>
-          <p:nvPr>
-            <p:ph type="title"/>
-          </p:nvPr>
-        </p:nvSpPr>
-        <p:spPr/>
-        <p:txBody>
-          <a:bodyPr/>
-          <a:lstStyle/>
-          <a:p>
-            <a:r>
-              <a:rPr lang="en-US" dirty="0"/>
-              <a:t>Sample Composition</a:t>
+              <a:t>Research Study Demographics</a:t>
             </a:r>
           </a:p>
         </p:txBody>
@@ -6868,6 +6929,167 @@
 </p:sld>
 </file>
 
+<file path=ppt/slides/slide5.xml><?xml version="1.0" encoding="utf-8"?>
+<p:sld xmlns:a="http://schemas.openxmlformats.org/drawingml/2006/main" xmlns:r="http://schemas.openxmlformats.org/officeDocument/2006/relationships" xmlns:p="http://schemas.openxmlformats.org/presentationml/2006/main">
+  <p:cSld>
+    <p:spTree>
+      <p:nvGrpSpPr>
+        <p:cNvPr id="1" name=""/>
+        <p:cNvGrpSpPr/>
+        <p:nvPr/>
+      </p:nvGrpSpPr>
+      <p:grpSpPr>
+        <a:xfrm>
+          <a:off x="0" y="0"/>
+          <a:ext cx="0" cy="0"/>
+          <a:chOff x="0" y="0"/>
+          <a:chExt cx="0" cy="0"/>
+        </a:xfrm>
+      </p:grpSpPr>
+      <p:sp>
+        <p:nvSpPr>
+          <p:cNvPr id="2" name="Title 1">
+            <a:extLst>
+              <a:ext uri="{FF2B5EF4-FFF2-40B4-BE49-F238E27FC236}">
+                <a16:creationId xmlns:a16="http://schemas.microsoft.com/office/drawing/2014/main" id="{70A74290-7A5B-944D-96CB-64FAD60C5762}"/>
+              </a:ext>
+            </a:extLst>
+          </p:cNvPr>
+          <p:cNvSpPr>
+            <a:spLocks noGrp="1"/>
+          </p:cNvSpPr>
+          <p:nvPr>
+            <p:ph type="title"/>
+          </p:nvPr>
+        </p:nvSpPr>
+        <p:spPr/>
+        <p:txBody>
+          <a:bodyPr/>
+          <a:lstStyle/>
+          <a:p>
+            <a:r>
+              <a:rPr lang="en-US" dirty="0"/>
+              <a:t>Research Study Procedure</a:t>
+            </a:r>
+          </a:p>
+        </p:txBody>
+      </p:sp>
+      <p:sp>
+        <p:nvSpPr>
+          <p:cNvPr id="3" name="Content Placeholder 2">
+            <a:extLst>
+              <a:ext uri="{FF2B5EF4-FFF2-40B4-BE49-F238E27FC236}">
+                <a16:creationId xmlns:a16="http://schemas.microsoft.com/office/drawing/2014/main" id="{87605321-9DDD-BF41-91D9-D7179BA8A3F1}"/>
+              </a:ext>
+            </a:extLst>
+          </p:cNvPr>
+          <p:cNvSpPr>
+            <a:spLocks noGrp="1"/>
+          </p:cNvSpPr>
+          <p:nvPr>
+            <p:ph idx="1"/>
+          </p:nvPr>
+        </p:nvSpPr>
+        <p:spPr>
+          <a:xfrm>
+            <a:off x="490194" y="2459170"/>
+            <a:ext cx="11265031" cy="4102390"/>
+          </a:xfrm>
+        </p:spPr>
+        <p:txBody>
+          <a:bodyPr>
+            <a:normAutofit lnSpcReduction="10000"/>
+          </a:bodyPr>
+          <a:lstStyle/>
+          <a:p>
+            <a:pPr marL="514350" indent="-514350">
+              <a:buFont typeface="+mj-lt"/>
+              <a:buAutoNum type="arabicPeriod"/>
+            </a:pPr>
+            <a:r>
+              <a:rPr lang="en-US" dirty="0"/>
+              <a:t>Provided participants context for the study</a:t>
+            </a:r>
+          </a:p>
+          <a:p>
+            <a:pPr marL="514350" indent="-514350">
+              <a:buFont typeface="+mj-lt"/>
+              <a:buAutoNum type="arabicPeriod"/>
+            </a:pPr>
+            <a:r>
+              <a:rPr lang="en-US" dirty="0"/>
+              <a:t>Administered </a:t>
+            </a:r>
+            <a:r>
+              <a:rPr lang="en-US" i="1" dirty="0"/>
+              <a:t>FireEdge</a:t>
+            </a:r>
+            <a:r>
+              <a:rPr lang="en-US" dirty="0"/>
+              <a:t> under standardized conditions</a:t>
+            </a:r>
+          </a:p>
+          <a:p>
+            <a:pPr marL="514350" indent="-514350">
+              <a:buFont typeface="+mj-lt"/>
+              <a:buAutoNum type="arabicPeriod"/>
+            </a:pPr>
+            <a:r>
+              <a:rPr lang="en-US" dirty="0"/>
+              <a:t>Obtained ratings of job performance</a:t>
+            </a:r>
+          </a:p>
+          <a:p>
+            <a:pPr marL="0" indent="0">
+              <a:buNone/>
+            </a:pPr>
+            <a:r>
+              <a:rPr lang="en-US" dirty="0"/>
+              <a:t>- - - - - - - - - - - - - - - - - - - - - - - - - - - - - - - - - - - - - - - - - - - - - - - - - - - - - - </a:t>
+            </a:r>
+          </a:p>
+          <a:p>
+            <a:pPr marL="0" indent="0">
+              <a:buNone/>
+            </a:pPr>
+            <a:r>
+              <a:rPr lang="en-US" dirty="0"/>
+              <a:t>4.   Performed exploratory data analysis (EDA)</a:t>
+            </a:r>
+          </a:p>
+          <a:p>
+            <a:pPr marL="0" indent="0">
+              <a:buNone/>
+            </a:pPr>
+            <a:r>
+              <a:rPr lang="en-US" dirty="0"/>
+              <a:t>5.   Employed statistical analyses (correlation, regression, ANOVA)</a:t>
+            </a:r>
+          </a:p>
+          <a:p>
+            <a:pPr marL="0" indent="0">
+              <a:buNone/>
+            </a:pPr>
+            <a:r>
+              <a:rPr lang="en-US" dirty="0"/>
+              <a:t>6.   Summarized findings and developed technical documentation</a:t>
+            </a:r>
+          </a:p>
+        </p:txBody>
+      </p:sp>
+    </p:spTree>
+    <p:extLst>
+      <p:ext uri="{BB962C8B-B14F-4D97-AF65-F5344CB8AC3E}">
+        <p14:creationId xmlns:p14="http://schemas.microsoft.com/office/powerpoint/2010/main" val="2473716912"/>
+      </p:ext>
+    </p:extLst>
+  </p:cSld>
+  <p:clrMapOvr>
+    <a:masterClrMapping/>
+  </p:clrMapOvr>
+</p:sld>
+</file>
+
 <file path=ppt/slides/slide6.xml><?xml version="1.0" encoding="utf-8"?>
 <p:sld xmlns:a="http://schemas.openxmlformats.org/drawingml/2006/main" xmlns:r="http://schemas.openxmlformats.org/officeDocument/2006/relationships" xmlns:p="http://schemas.openxmlformats.org/presentationml/2006/main">
   <p:cSld>
@@ -6903,12 +7125,14 @@
         </p:nvSpPr>
         <p:spPr/>
         <p:txBody>
-          <a:bodyPr/>
-          <a:lstStyle/>
-          <a:p>
-            <a:r>
-              <a:rPr lang="en-US" dirty="0"/>
-              <a:t>Pearson Correlation Coefficient</a:t>
+          <a:bodyPr>
+            <a:normAutofit/>
+          </a:bodyPr>
+          <a:lstStyle/>
+          <a:p>
+            <a:r>
+              <a:rPr lang="en-US" dirty="0"/>
+              <a:t>Study Outcome 1: Correlation Analysis</a:t>
             </a:r>
           </a:p>
         </p:txBody>
@@ -6932,16 +7156,41 @@
         <p:spPr>
           <a:xfrm>
             <a:off x="601361" y="2478024"/>
-            <a:ext cx="11129319" cy="4029868"/>
+            <a:ext cx="11221184" cy="4172158"/>
           </a:xfrm>
         </p:spPr>
         <p:txBody>
-          <a:bodyPr/>
-          <a:lstStyle/>
-          <a:p>
-            <a:r>
-              <a:rPr lang="en-US" dirty="0"/>
-              <a:t>A significant, positive correlation between </a:t>
+          <a:bodyPr>
+            <a:normAutofit/>
+          </a:bodyPr>
+          <a:lstStyle/>
+          <a:p>
+            <a:r>
+              <a:rPr lang="en-US" b="1" dirty="0"/>
+              <a:t>Hypothesis: </a:t>
+            </a:r>
+            <a:r>
+              <a:rPr lang="en-US" dirty="0"/>
+              <a:t>As </a:t>
+            </a:r>
+            <a:r>
+              <a:rPr lang="en-US" i="1" dirty="0"/>
+              <a:t>FireEdge </a:t>
+            </a:r>
+            <a:r>
+              <a:rPr lang="en-US" dirty="0"/>
+              <a:t>scores rise, so too does job performance </a:t>
+            </a:r>
+            <a:endParaRPr lang="en-US" b="1" dirty="0"/>
+          </a:p>
+          <a:p>
+            <a:r>
+              <a:rPr lang="en-US" b="1" dirty="0"/>
+              <a:t>Test:</a:t>
+            </a:r>
+            <a:r>
+              <a:rPr lang="en-US" dirty="0"/>
+              <a:t> A significant, positive correlation between </a:t>
             </a:r>
             <a:r>
               <a:rPr lang="en-US" i="1" dirty="0"/>
@@ -6968,7 +7217,7 @@
             </a:r>
             <a:r>
               <a:rPr lang="en-US" dirty="0"/>
-              <a:t> &lt; .001</a:t>
+              <a:t> &lt; .000</a:t>
             </a:r>
           </a:p>
           <a:p>
@@ -6978,7 +7227,7 @@
               <a:t>Pearson Correlation </a:t>
             </a:r>
             <a:r>
-              <a:rPr lang="en-US" b="1" i="1" dirty="0"/>
+              <a:rPr lang="en-US" i="1" dirty="0"/>
               <a:t>r</a:t>
             </a:r>
             <a:r>
@@ -6987,6 +7236,10 @@
             </a:r>
           </a:p>
           <a:p>
+            <a:r>
+              <a:rPr lang="en-US" b="1" dirty="0"/>
+              <a:t> Conclusion: </a:t>
+            </a:r>
             <a:r>
               <a:rPr lang="en-US" dirty="0"/>
               <a:t>The </a:t>
@@ -7005,13 +7258,15 @@
             </a:r>
             <a:r>
               <a:rPr lang="en-US" dirty="0"/>
-              <a:t>demonstrates that the correlation coefficient is significantly different from zero </a:t>
-            </a:r>
-          </a:p>
-          <a:p>
-            <a:r>
-              <a:rPr lang="en-US" dirty="0"/>
-              <a:t>As test scores rise, so too does job performance</a:t>
+              <a:t>demonstrates that the correlation coefficient is significantly different from zero, indicating a relationship between </a:t>
+            </a:r>
+            <a:r>
+              <a:rPr lang="en-US" i="1" dirty="0"/>
+              <a:t>FireEdge</a:t>
+            </a:r>
+            <a:r>
+              <a:rPr lang="en-US" dirty="0"/>
+              <a:t> scores and job performance</a:t>
             </a:r>
           </a:p>
           <a:p>
@@ -7067,39 +7322,6 @@
         </p:nvSpPr>
         <p:spPr/>
         <p:txBody>
-          <a:bodyPr/>
-          <a:lstStyle/>
-          <a:p>
-            <a:r>
-              <a:rPr lang="en-US" dirty="0"/>
-              <a:t>Linear Regression Model</a:t>
-            </a:r>
-          </a:p>
-        </p:txBody>
-      </p:sp>
-      <p:sp>
-        <p:nvSpPr>
-          <p:cNvPr id="4" name="Content Placeholder 3">
-            <a:extLst>
-              <a:ext uri="{FF2B5EF4-FFF2-40B4-BE49-F238E27FC236}">
-                <a16:creationId xmlns:a16="http://schemas.microsoft.com/office/drawing/2014/main" id="{9A27F177-6009-FC48-8F94-B16D7312A897}"/>
-              </a:ext>
-            </a:extLst>
-          </p:cNvPr>
-          <p:cNvSpPr>
-            <a:spLocks noGrp="1"/>
-          </p:cNvSpPr>
-          <p:nvPr>
-            <p:ph sz="half" idx="2"/>
-          </p:nvPr>
-        </p:nvSpPr>
-        <p:spPr>
-          <a:xfrm>
-            <a:off x="568411" y="2298913"/>
-            <a:ext cx="5690491" cy="4152646"/>
-          </a:xfrm>
-        </p:spPr>
-        <p:txBody>
           <a:bodyPr>
             <a:normAutofit/>
           </a:bodyPr>
@@ -7107,7 +7329,64 @@
           <a:p>
             <a:r>
               <a:rPr lang="en-US" dirty="0"/>
-              <a:t>Correlation = .273, </a:t>
+              <a:t>Study Outcome 2: Linear Regression</a:t>
+            </a:r>
+          </a:p>
+        </p:txBody>
+      </p:sp>
+      <p:sp>
+        <p:nvSpPr>
+          <p:cNvPr id="4" name="Content Placeholder 3">
+            <a:extLst>
+              <a:ext uri="{FF2B5EF4-FFF2-40B4-BE49-F238E27FC236}">
+                <a16:creationId xmlns:a16="http://schemas.microsoft.com/office/drawing/2014/main" id="{9A27F177-6009-FC48-8F94-B16D7312A897}"/>
+              </a:ext>
+            </a:extLst>
+          </p:cNvPr>
+          <p:cNvSpPr>
+            <a:spLocks noGrp="1"/>
+          </p:cNvSpPr>
+          <p:nvPr>
+            <p:ph sz="half" idx="2"/>
+          </p:nvPr>
+        </p:nvSpPr>
+        <p:spPr>
+          <a:xfrm>
+            <a:off x="350985" y="2298913"/>
+            <a:ext cx="5843266" cy="4152646"/>
+          </a:xfrm>
+        </p:spPr>
+        <p:txBody>
+          <a:bodyPr>
+            <a:normAutofit/>
+          </a:bodyPr>
+          <a:lstStyle/>
+          <a:p>
+            <a:r>
+              <a:rPr lang="en-US" b="1" dirty="0"/>
+              <a:t>Hypothesis:</a:t>
+            </a:r>
+            <a:r>
+              <a:rPr lang="en-US" dirty="0"/>
+              <a:t> A statistically significant slope in line of best fit</a:t>
+            </a:r>
+            <a:endParaRPr lang="en-US" b="1" dirty="0"/>
+          </a:p>
+          <a:p>
+            <a:r>
+              <a:rPr lang="en-US" b="1" dirty="0"/>
+              <a:t>Test:</a:t>
+            </a:r>
+            <a:r>
+              <a:rPr lang="en-US" dirty="0"/>
+              <a:t> Significant F-ratio test</a:t>
+            </a:r>
+          </a:p>
+          <a:p>
+            <a:pPr lvl="1"/>
+            <a:r>
+              <a:rPr lang="en-US" dirty="0"/>
+              <a:t>F(1, 295) = 23.85, </a:t>
             </a:r>
             <a:r>
               <a:rPr lang="en-US" i="1" dirty="0"/>
@@ -7120,36 +7399,22 @@
           </a:p>
           <a:p>
             <a:r>
-              <a:rPr lang="en-US" dirty="0"/>
-              <a:t>Test predicts job performance</a:t>
-            </a:r>
-          </a:p>
-          <a:p>
-            <a:r>
-              <a:rPr lang="en-US" dirty="0"/>
-              <a:t>Line of best fit trends upward</a:t>
-            </a:r>
-          </a:p>
-          <a:p>
-            <a:r>
-              <a:rPr lang="en-US" dirty="0"/>
-              <a:t>F-test is also significant</a:t>
-            </a:r>
-          </a:p>
-          <a:p>
-            <a:pPr lvl="1"/>
-            <a:r>
-              <a:rPr lang="en-US" dirty="0"/>
-              <a:t>F(1, 295) = 23.85, </a:t>
+              <a:rPr lang="en-US" b="1" dirty="0"/>
+              <a:t>Conclusion:</a:t>
+            </a:r>
+            <a:r>
+              <a:rPr lang="en-US" dirty="0"/>
+              <a:t> Imputing a </a:t>
             </a:r>
             <a:r>
               <a:rPr lang="en-US" i="1" dirty="0"/>
-              <a:t>p</a:t>
-            </a:r>
-            <a:r>
-              <a:rPr lang="en-US" dirty="0"/>
-              <a:t> &lt; .001</a:t>
-            </a:r>
+              <a:t>FireEdge</a:t>
+            </a:r>
+            <a:r>
+              <a:rPr lang="en-US" dirty="0"/>
+              <a:t> score should provide a reasonably stable estimate of future job performance</a:t>
+            </a:r>
+            <a:endParaRPr lang="en-US" b="1" dirty="0"/>
           </a:p>
         </p:txBody>
       </p:sp>
@@ -7175,7 +7440,7 @@
         </p:blipFill>
         <p:spPr>
           <a:xfrm>
-            <a:off x="6013174" y="2128037"/>
+            <a:off x="6050118" y="2128037"/>
             <a:ext cx="6052930" cy="4323522"/>
           </a:xfrm>
           <a:prstGeom prst="rect">
@@ -7231,44 +7496,6 @@
         </p:nvSpPr>
         <p:spPr/>
         <p:txBody>
-          <a:bodyPr/>
-          <a:lstStyle/>
-          <a:p>
-            <a:r>
-              <a:rPr lang="en-US" dirty="0"/>
-              <a:t>Analysis of Variance on </a:t>
-            </a:r>
-            <a:r>
-              <a:rPr lang="en-US" i="1" dirty="0"/>
-              <a:t>FireEdge Score</a:t>
-            </a:r>
-            <a:endParaRPr lang="en-US" dirty="0"/>
-          </a:p>
-        </p:txBody>
-      </p:sp>
-      <p:sp>
-        <p:nvSpPr>
-          <p:cNvPr id="3" name="Content Placeholder 2">
-            <a:extLst>
-              <a:ext uri="{FF2B5EF4-FFF2-40B4-BE49-F238E27FC236}">
-                <a16:creationId xmlns:a16="http://schemas.microsoft.com/office/drawing/2014/main" id="{A55B8BA2-6CE8-0346-9E13-585ADF57F59B}"/>
-              </a:ext>
-            </a:extLst>
-          </p:cNvPr>
-          <p:cNvSpPr>
-            <a:spLocks noGrp="1"/>
-          </p:cNvSpPr>
-          <p:nvPr>
-            <p:ph sz="half" idx="1"/>
-          </p:nvPr>
-        </p:nvSpPr>
-        <p:spPr>
-          <a:xfrm>
-            <a:off x="555390" y="2478024"/>
-            <a:ext cx="4937760" cy="3831336"/>
-          </a:xfrm>
-        </p:spPr>
-        <p:txBody>
           <a:bodyPr>
             <a:normAutofit/>
           </a:bodyPr>
@@ -7276,13 +7503,80 @@
           <a:p>
             <a:r>
               <a:rPr lang="en-US" dirty="0"/>
-              <a:t>Non-significant findings</a:t>
-            </a:r>
-          </a:p>
-          <a:p>
-            <a:r>
-              <a:rPr lang="en-US" dirty="0"/>
-              <a:t>F(4,274) = .663, </a:t>
+              <a:t>Study Outcome 3: Analysis of Variance</a:t>
+            </a:r>
+          </a:p>
+        </p:txBody>
+      </p:sp>
+      <p:sp>
+        <p:nvSpPr>
+          <p:cNvPr id="3" name="Content Placeholder 2">
+            <a:extLst>
+              <a:ext uri="{FF2B5EF4-FFF2-40B4-BE49-F238E27FC236}">
+                <a16:creationId xmlns:a16="http://schemas.microsoft.com/office/drawing/2014/main" id="{A55B8BA2-6CE8-0346-9E13-585ADF57F59B}"/>
+              </a:ext>
+            </a:extLst>
+          </p:cNvPr>
+          <p:cNvSpPr>
+            <a:spLocks noGrp="1"/>
+          </p:cNvSpPr>
+          <p:nvPr>
+            <p:ph sz="half" idx="1"/>
+          </p:nvPr>
+        </p:nvSpPr>
+        <p:spPr>
+          <a:xfrm>
+            <a:off x="409186" y="2189698"/>
+            <a:ext cx="5216059" cy="3831336"/>
+          </a:xfrm>
+        </p:spPr>
+        <p:txBody>
+          <a:bodyPr>
+            <a:normAutofit/>
+          </a:bodyPr>
+          <a:lstStyle/>
+          <a:p>
+            <a:r>
+              <a:rPr lang="en-US" b="1" dirty="0"/>
+              <a:t>Hypothesis:</a:t>
+            </a:r>
+            <a:r>
+              <a:rPr lang="en-US" dirty="0"/>
+              <a:t> No differences in </a:t>
+            </a:r>
+            <a:r>
+              <a:rPr lang="en-US" i="1" dirty="0"/>
+              <a:t>FireEdge</a:t>
+            </a:r>
+            <a:r>
+              <a:rPr lang="en-US" dirty="0"/>
+              <a:t> scores when grouped by race</a:t>
+            </a:r>
+            <a:endParaRPr lang="en-US" b="1" dirty="0"/>
+          </a:p>
+          <a:p>
+            <a:r>
+              <a:rPr lang="en-US" b="1" dirty="0"/>
+              <a:t>Test:</a:t>
+            </a:r>
+            <a:r>
+              <a:rPr lang="en-US" dirty="0"/>
+              <a:t> Non-significant findings</a:t>
+            </a:r>
+          </a:p>
+          <a:p>
+            <a:pPr lvl="1"/>
+            <a:r>
+              <a:rPr lang="en-US" dirty="0"/>
+              <a:t>F(</a:t>
+            </a:r>
+            <a:r>
+              <a:rPr lang="en-US"/>
+              <a:t>4, 274</a:t>
+            </a:r>
+            <a:r>
+              <a:rPr lang="en-US" dirty="0"/>
+              <a:t>) = .663, </a:t>
             </a:r>
             <a:r>
               <a:rPr lang="en-US" i="1" dirty="0"/>
@@ -7290,27 +7584,25 @@
             </a:r>
             <a:r>
               <a:rPr lang="en-US" dirty="0"/>
-              <a:t> = .618</a:t>
-            </a:r>
-          </a:p>
-          <a:p>
-            <a:r>
-              <a:rPr lang="en-US" dirty="0"/>
-              <a:t>No evidence of significant differences in </a:t>
-            </a:r>
-            <a:r>
-              <a:rPr lang="en-US" i="1" dirty="0"/>
-              <a:t>FireEdge</a:t>
-            </a:r>
-            <a:r>
-              <a:rPr lang="en-US" dirty="0"/>
-              <a:t> scores by Race/Ethnicity</a:t>
-            </a:r>
-          </a:p>
-          <a:p>
-            <a:r>
-              <a:rPr lang="en-US" dirty="0"/>
-              <a:t>Test scores were consistent across Race</a:t>
+              <a:t> </a:t>
+            </a:r>
+            <a:r>
+              <a:rPr lang="en-US"/>
+              <a:t>= .</a:t>
+            </a:r>
+            <a:r>
+              <a:rPr lang="en-US" dirty="0"/>
+              <a:t>618</a:t>
+            </a:r>
+          </a:p>
+          <a:p>
+            <a:r>
+              <a:rPr lang="en-US" b="1" dirty="0"/>
+              <a:t>Conclusion: </a:t>
+            </a:r>
+            <a:r>
+              <a:rPr lang="en-US" dirty="0"/>
+              <a:t>No evidence of test bias in scores across race</a:t>
             </a:r>
           </a:p>
         </p:txBody>
@@ -7330,14 +7622,14 @@
           <p:nvPr/>
         </p:nvPicPr>
         <p:blipFill>
-          <a:blip r:embed="rId2"/>
+          <a:blip r:embed="rId3"/>
           <a:stretch>
             <a:fillRect/>
           </a:stretch>
         </p:blipFill>
         <p:spPr>
           <a:xfrm>
-            <a:off x="5385104" y="2189698"/>
+            <a:off x="5542121" y="2189698"/>
             <a:ext cx="6453128" cy="3982502"/>
           </a:xfrm>
           <a:prstGeom prst="rect">
@@ -7380,7 +7672,7 @@
           <p:cNvPr id="2" name="Title 1">
             <a:extLst>
               <a:ext uri="{FF2B5EF4-FFF2-40B4-BE49-F238E27FC236}">
-                <a16:creationId xmlns:a16="http://schemas.microsoft.com/office/drawing/2014/main" id="{C4E51C85-CBB3-5946-A05B-4418E139C640}"/>
+                <a16:creationId xmlns:a16="http://schemas.microsoft.com/office/drawing/2014/main" id="{B6470270-9ACC-8F48-B55B-C856C7F36388}"/>
               </a:ext>
             </a:extLst>
           </p:cNvPr>
@@ -7398,7 +7690,7 @@
           <a:p>
             <a:r>
               <a:rPr lang="en-US" dirty="0"/>
-              <a:t>Study Limitations</a:t>
+              <a:t>Research Study Conclusions</a:t>
             </a:r>
           </a:p>
         </p:txBody>
@@ -7408,7 +7700,7 @@
           <p:cNvPr id="3" name="Content Placeholder 2">
             <a:extLst>
               <a:ext uri="{FF2B5EF4-FFF2-40B4-BE49-F238E27FC236}">
-                <a16:creationId xmlns:a16="http://schemas.microsoft.com/office/drawing/2014/main" id="{C904CA65-7CA9-4B4F-9578-BCDD809E9874}"/>
+                <a16:creationId xmlns:a16="http://schemas.microsoft.com/office/drawing/2014/main" id="{ED858B69-4EC0-6F41-B865-6D8348A708F8}"/>
               </a:ext>
             </a:extLst>
           </p:cNvPr>
@@ -7421,49 +7713,88 @@
         </p:nvSpPr>
         <p:spPr>
           <a:xfrm>
-            <a:off x="580107" y="2478024"/>
-            <a:ext cx="10611376" cy="3941064"/>
+            <a:off x="537328" y="2379167"/>
+            <a:ext cx="11189616" cy="4079295"/>
           </a:xfrm>
         </p:spPr>
         <p:txBody>
-          <a:bodyPr/>
-          <a:lstStyle/>
-          <a:p>
-            <a:r>
-              <a:rPr lang="en-US" dirty="0"/>
-              <a:t>Concurrent study design</a:t>
-            </a:r>
-          </a:p>
-          <a:p>
-            <a:r>
-              <a:rPr lang="en-US" dirty="0"/>
-              <a:t>More diversity in study participants</a:t>
-            </a:r>
-          </a:p>
-          <a:p>
-            <a:r>
-              <a:rPr lang="en-US" dirty="0"/>
-              <a:t>Potential bias in job performance ratings </a:t>
-            </a:r>
-          </a:p>
-          <a:p>
-            <a:r>
-              <a:rPr lang="en-US" dirty="0"/>
-              <a:t>Overpredicting performance due to qualified applicant pool</a:t>
-            </a:r>
-          </a:p>
-          <a:p>
-            <a:r>
-              <a:rPr lang="en-US" dirty="0"/>
-              <a:t>Correcting correlation coefficients</a:t>
-            </a:r>
+          <a:bodyPr>
+            <a:normAutofit fontScale="92500"/>
+          </a:bodyPr>
+          <a:lstStyle/>
+          <a:p>
+            <a:r>
+              <a:rPr lang="en-US" dirty="0"/>
+              <a:t>Empirical evidence that test scores are significantly correlated with subsequent firefighter job performance(</a:t>
+            </a:r>
+            <a:r>
+              <a:rPr lang="en-US" i="1" dirty="0"/>
+              <a:t>r</a:t>
+            </a:r>
+            <a:r>
+              <a:rPr lang="en-US" dirty="0"/>
+              <a:t> = .273, </a:t>
+            </a:r>
+            <a:r>
+              <a:rPr lang="en-US" i="1" dirty="0"/>
+              <a:t>p</a:t>
+            </a:r>
+            <a:r>
+              <a:rPr lang="en-US" dirty="0"/>
+              <a:t> &lt; .000)</a:t>
+            </a:r>
+          </a:p>
+          <a:p>
+            <a:r>
+              <a:rPr lang="en-US" dirty="0"/>
+              <a:t>Analysis of Variance (ANOVA) test concludes no significant differences on </a:t>
+            </a:r>
+            <a:r>
+              <a:rPr lang="en-US" i="1" dirty="0"/>
+              <a:t>FireEdge</a:t>
+            </a:r>
+            <a:r>
+              <a:rPr lang="en-US" dirty="0"/>
+              <a:t> test score by Race</a:t>
+            </a:r>
+          </a:p>
+          <a:p>
+            <a:pPr lvl="1"/>
+            <a:r>
+              <a:rPr lang="en-US" dirty="0"/>
+              <a:t>Ensures no bias/adverse impact in test scores</a:t>
+            </a:r>
+          </a:p>
+          <a:p>
+            <a:pPr lvl="1"/>
+            <a:r>
+              <a:rPr lang="en-US" dirty="0"/>
+              <a:t>Rank ordering of top-down scoring appropriate</a:t>
+            </a:r>
+          </a:p>
+          <a:p>
+            <a:r>
+              <a:rPr lang="en-US" dirty="0"/>
+              <a:t>We conclude that higher scores on the </a:t>
+            </a:r>
+            <a:r>
+              <a:rPr lang="en-US" i="1" dirty="0"/>
+              <a:t>FireEdge</a:t>
+            </a:r>
+            <a:r>
+              <a:rPr lang="en-US" dirty="0"/>
+              <a:t> will yield more successful firefighters in general on the job, without adverse impact</a:t>
+            </a:r>
+          </a:p>
+          <a:p>
+            <a:endParaRPr lang="en-US" dirty="0"/>
           </a:p>
         </p:txBody>
       </p:sp>
     </p:spTree>
     <p:extLst>
       <p:ext uri="{BB962C8B-B14F-4D97-AF65-F5344CB8AC3E}">
-        <p14:creationId xmlns:p14="http://schemas.microsoft.com/office/powerpoint/2010/main" val="537083193"/>
+        <p14:creationId xmlns:p14="http://schemas.microsoft.com/office/powerpoint/2010/main" val="245607193"/>
       </p:ext>
     </p:extLst>
   </p:cSld>

</xml_diff>